<commit_message>
Add Columbia Dental, AZFare, Swedish, LA Parking, and Philly Misc to Hermes with Texting.
</commit_message>
<xml_diff>
--- a/doc/hermes-20230926.pptx
+++ b/doc/hermes-20230926.pptx
@@ -267,7 +267,7 @@
           <a:p>
             <a:fld id="{A868D44A-8BAE-4BE2-A1F5-6D4E75A8FDF5}" type="datetimeFigureOut">
               <a:rPr lang="en-US" smtClean="0"/>
-              <a:t>9/27/2023</a:t>
+              <a:t>9/29/2023</a:t>
             </a:fld>
             <a:endParaRPr lang="en-US"/>
           </a:p>
@@ -465,7 +465,7 @@
           <a:p>
             <a:fld id="{A868D44A-8BAE-4BE2-A1F5-6D4E75A8FDF5}" type="datetimeFigureOut">
               <a:rPr lang="en-US" smtClean="0"/>
-              <a:t>9/27/2023</a:t>
+              <a:t>9/29/2023</a:t>
             </a:fld>
             <a:endParaRPr lang="en-US"/>
           </a:p>
@@ -673,7 +673,7 @@
           <a:p>
             <a:fld id="{A868D44A-8BAE-4BE2-A1F5-6D4E75A8FDF5}" type="datetimeFigureOut">
               <a:rPr lang="en-US" smtClean="0"/>
-              <a:t>9/27/2023</a:t>
+              <a:t>9/29/2023</a:t>
             </a:fld>
             <a:endParaRPr lang="en-US"/>
           </a:p>
@@ -871,7 +871,7 @@
           <a:p>
             <a:fld id="{A868D44A-8BAE-4BE2-A1F5-6D4E75A8FDF5}" type="datetimeFigureOut">
               <a:rPr lang="en-US" smtClean="0"/>
-              <a:t>9/27/2023</a:t>
+              <a:t>9/29/2023</a:t>
             </a:fld>
             <a:endParaRPr lang="en-US"/>
           </a:p>
@@ -1146,7 +1146,7 @@
           <a:p>
             <a:fld id="{A868D44A-8BAE-4BE2-A1F5-6D4E75A8FDF5}" type="datetimeFigureOut">
               <a:rPr lang="en-US" smtClean="0"/>
-              <a:t>9/27/2023</a:t>
+              <a:t>9/29/2023</a:t>
             </a:fld>
             <a:endParaRPr lang="en-US"/>
           </a:p>
@@ -1411,7 +1411,7 @@
           <a:p>
             <a:fld id="{A868D44A-8BAE-4BE2-A1F5-6D4E75A8FDF5}" type="datetimeFigureOut">
               <a:rPr lang="en-US" smtClean="0"/>
-              <a:t>9/27/2023</a:t>
+              <a:t>9/29/2023</a:t>
             </a:fld>
             <a:endParaRPr lang="en-US"/>
           </a:p>
@@ -1823,7 +1823,7 @@
           <a:p>
             <a:fld id="{A868D44A-8BAE-4BE2-A1F5-6D4E75A8FDF5}" type="datetimeFigureOut">
               <a:rPr lang="en-US" smtClean="0"/>
-              <a:t>9/27/2023</a:t>
+              <a:t>9/29/2023</a:t>
             </a:fld>
             <a:endParaRPr lang="en-US"/>
           </a:p>
@@ -1964,7 +1964,7 @@
           <a:p>
             <a:fld id="{A868D44A-8BAE-4BE2-A1F5-6D4E75A8FDF5}" type="datetimeFigureOut">
               <a:rPr lang="en-US" smtClean="0"/>
-              <a:t>9/27/2023</a:t>
+              <a:t>9/29/2023</a:t>
             </a:fld>
             <a:endParaRPr lang="en-US"/>
           </a:p>
@@ -2077,7 +2077,7 @@
           <a:p>
             <a:fld id="{A868D44A-8BAE-4BE2-A1F5-6D4E75A8FDF5}" type="datetimeFigureOut">
               <a:rPr lang="en-US" smtClean="0"/>
-              <a:t>9/27/2023</a:t>
+              <a:t>9/29/2023</a:t>
             </a:fld>
             <a:endParaRPr lang="en-US"/>
           </a:p>
@@ -2388,7 +2388,7 @@
           <a:p>
             <a:fld id="{A868D44A-8BAE-4BE2-A1F5-6D4E75A8FDF5}" type="datetimeFigureOut">
               <a:rPr lang="en-US" smtClean="0"/>
-              <a:t>9/27/2023</a:t>
+              <a:t>9/29/2023</a:t>
             </a:fld>
             <a:endParaRPr lang="en-US"/>
           </a:p>
@@ -2676,7 +2676,7 @@
           <a:p>
             <a:fld id="{A868D44A-8BAE-4BE2-A1F5-6D4E75A8FDF5}" type="datetimeFigureOut">
               <a:rPr lang="en-US" smtClean="0"/>
-              <a:t>9/27/2023</a:t>
+              <a:t>9/29/2023</a:t>
             </a:fld>
             <a:endParaRPr lang="en-US"/>
           </a:p>
@@ -2917,7 +2917,7 @@
           <a:p>
             <a:fld id="{A868D44A-8BAE-4BE2-A1F5-6D4E75A8FDF5}" type="datetimeFigureOut">
               <a:rPr lang="en-US" smtClean="0"/>
-              <a:t>9/27/2023</a:t>
+              <a:t>9/29/2023</a:t>
             </a:fld>
             <a:endParaRPr lang="en-US"/>
           </a:p>
@@ -3549,7 +3549,7 @@
         <p:spPr/>
         <p:txBody>
           <a:bodyPr>
-            <a:normAutofit fontScale="85000" lnSpcReduction="20000"/>
+            <a:normAutofit fontScale="77500" lnSpcReduction="20000"/>
           </a:bodyPr>
           <a:lstStyle/>
           <a:p>
@@ -3746,6 +3746,21 @@
             <a:r>
               <a:rPr lang="en-US" dirty="0"/>
               <a:t>.</a:t>
+            </a:r>
+          </a:p>
+          <a:p>
+            <a:pPr lvl="1">
+              <a:lnSpc>
+                <a:spcPct val="124000"/>
+              </a:lnSpc>
+            </a:pPr>
+            <a:r>
+              <a:rPr lang="en-US" b="1" i="1" dirty="0"/>
+              <a:t>Create less work</a:t>
+            </a:r>
+            <a:r>
+              <a:rPr lang="en-US" dirty="0"/>
+              <a:t> for IT.</a:t>
             </a:r>
           </a:p>
         </p:txBody>
@@ -4237,6 +4252,55 @@
                       </p:childTnLst>
                     </p:cTn>
                   </p:par>
+                  <p:par>
+                    <p:cTn id="39" fill="hold">
+                      <p:stCondLst>
+                        <p:cond delay="indefinite"/>
+                      </p:stCondLst>
+                      <p:childTnLst>
+                        <p:par>
+                          <p:cTn id="40" fill="hold">
+                            <p:stCondLst>
+                              <p:cond delay="0"/>
+                            </p:stCondLst>
+                            <p:childTnLst>
+                              <p:par>
+                                <p:cTn id="41" presetID="1" presetClass="entr" presetSubtype="0" fill="hold" grpId="0" nodeType="clickEffect">
+                                  <p:stCondLst>
+                                    <p:cond delay="0"/>
+                                  </p:stCondLst>
+                                  <p:childTnLst>
+                                    <p:set>
+                                      <p:cBhvr>
+                                        <p:cTn id="42" dur="1" fill="hold">
+                                          <p:stCondLst>
+                                            <p:cond delay="0"/>
+                                          </p:stCondLst>
+                                        </p:cTn>
+                                        <p:tgtEl>
+                                          <p:spTgt spid="3">
+                                            <p:txEl>
+                                              <p:pRg st="10" end="10"/>
+                                            </p:txEl>
+                                          </p:spTgt>
+                                        </p:tgtEl>
+                                        <p:attrNameLst>
+                                          <p:attrName>style.visibility</p:attrName>
+                                        </p:attrNameLst>
+                                      </p:cBhvr>
+                                      <p:to>
+                                        <p:strVal val="visible"/>
+                                      </p:to>
+                                    </p:set>
+                                  </p:childTnLst>
+                                </p:cTn>
+                              </p:par>
+                            </p:childTnLst>
+                          </p:cTn>
+                        </p:par>
+                      </p:childTnLst>
+                    </p:cTn>
+                  </p:par>
                 </p:childTnLst>
               </p:cTn>
               <p:prevCondLst>
@@ -4666,6 +4730,21 @@
             <a:r>
               <a:rPr lang="en-US" sz="2000" dirty="0"/>
               <a:t>.</a:t>
+            </a:r>
+          </a:p>
+          <a:p>
+            <a:pPr lvl="1">
+              <a:lnSpc>
+                <a:spcPct val="124000"/>
+              </a:lnSpc>
+            </a:pPr>
+            <a:r>
+              <a:rPr lang="en-US" sz="2000" b="1" i="1" dirty="0"/>
+              <a:t>Create less work</a:t>
+            </a:r>
+            <a:r>
+              <a:rPr lang="en-US" sz="2000" dirty="0"/>
+              <a:t> for IT.</a:t>
             </a:r>
           </a:p>
         </p:txBody>
@@ -4879,7 +4958,7 @@
             </a:pPr>
             <a:r>
               <a:rPr lang="en-US" sz="2400" b="1" dirty="0"/>
-              <a:t>Problem #2: How do we structure so we can iterate quickly?</a:t>
+              <a:t>Problem #2: How do we structure so we can easily maintain?</a:t>
             </a:r>
           </a:p>
           <a:p>
@@ -9653,6 +9732,41 @@
           </a:p>
         </p:txBody>
       </p:sp>
+      <p:sp>
+        <p:nvSpPr>
+          <p:cNvPr id="16" name="TextBox 15">
+            <a:extLst>
+              <a:ext uri="{FF2B5EF4-FFF2-40B4-BE49-F238E27FC236}">
+                <a16:creationId xmlns:a16="http://schemas.microsoft.com/office/drawing/2014/main" id="{EF71AF24-FA2B-4CE5-886F-0DD090C1D4DE}"/>
+              </a:ext>
+            </a:extLst>
+          </p:cNvPr>
+          <p:cNvSpPr txBox="1"/>
+          <p:nvPr/>
+        </p:nvSpPr>
+        <p:spPr>
+          <a:xfrm>
+            <a:off x="838200" y="1503113"/>
+            <a:ext cx="3062288" cy="246221"/>
+          </a:xfrm>
+          <a:prstGeom prst="rect">
+            <a:avLst/>
+          </a:prstGeom>
+          <a:noFill/>
+        </p:spPr>
+        <p:txBody>
+          <a:bodyPr wrap="square" rtlCol="0">
+            <a:spAutoFit/>
+          </a:bodyPr>
+          <a:lstStyle/>
+          <a:p>
+            <a:r>
+              <a:rPr lang="en-US" sz="1000" i="1" dirty="0"/>
+              <a:t>Best option per Account…</a:t>
+            </a:r>
+          </a:p>
+        </p:txBody>
+      </p:sp>
     </p:spTree>
     <p:extLst>
       <p:ext uri="{BB962C8B-B14F-4D97-AF65-F5344CB8AC3E}">
@@ -9844,6 +9958,79 @@
                                   </p:childTnLst>
                                 </p:cTn>
                               </p:par>
+                              <p:par>
+                                <p:cTn id="17" presetID="2" presetClass="entr" presetSubtype="2" fill="hold" grpId="0" nodeType="withEffect">
+                                  <p:stCondLst>
+                                    <p:cond delay="0"/>
+                                  </p:stCondLst>
+                                  <p:childTnLst>
+                                    <p:set>
+                                      <p:cBhvr>
+                                        <p:cTn id="18" dur="1" fill="hold">
+                                          <p:stCondLst>
+                                            <p:cond delay="0"/>
+                                          </p:stCondLst>
+                                        </p:cTn>
+                                        <p:tgtEl>
+                                          <p:spTgt spid="16"/>
+                                        </p:tgtEl>
+                                        <p:attrNameLst>
+                                          <p:attrName>style.visibility</p:attrName>
+                                        </p:attrNameLst>
+                                      </p:cBhvr>
+                                      <p:to>
+                                        <p:strVal val="visible"/>
+                                      </p:to>
+                                    </p:set>
+                                    <p:anim calcmode="lin" valueType="num">
+                                      <p:cBhvr additive="base">
+                                        <p:cTn id="19" dur="500" fill="hold"/>
+                                        <p:tgtEl>
+                                          <p:spTgt spid="16"/>
+                                        </p:tgtEl>
+                                        <p:attrNameLst>
+                                          <p:attrName>ppt_x</p:attrName>
+                                        </p:attrNameLst>
+                                      </p:cBhvr>
+                                      <p:tavLst>
+                                        <p:tav tm="0">
+                                          <p:val>
+                                            <p:strVal val="1+#ppt_w/2"/>
+                                          </p:val>
+                                        </p:tav>
+                                        <p:tav tm="100000">
+                                          <p:val>
+                                            <p:strVal val="#ppt_x"/>
+                                          </p:val>
+                                        </p:tav>
+                                      </p:tavLst>
+                                    </p:anim>
+                                    <p:anim calcmode="lin" valueType="num">
+                                      <p:cBhvr additive="base">
+                                        <p:cTn id="20" dur="500" fill="hold"/>
+                                        <p:tgtEl>
+                                          <p:spTgt spid="16"/>
+                                        </p:tgtEl>
+                                        <p:attrNameLst>
+                                          <p:attrName>ppt_y</p:attrName>
+                                        </p:attrNameLst>
+                                      </p:cBhvr>
+                                      <p:tavLst>
+                                        <p:tav tm="0">
+                                          <p:val>
+                                            <p:strVal val="#ppt_y"/>
+                                          </p:val>
+                                        </p:tav>
+                                        <p:tav tm="100000">
+                                          <p:val>
+                                            <p:strVal val="#ppt_y"/>
+                                          </p:val>
+                                        </p:tav>
+                                      </p:tavLst>
+                                    </p:anim>
+                                  </p:childTnLst>
+                                </p:cTn>
+                              </p:par>
                             </p:childTnLst>
                           </p:cTn>
                         </p:par>
@@ -9851,26 +10038,26 @@
                     </p:cTn>
                   </p:par>
                   <p:par>
-                    <p:cTn id="17" fill="hold">
+                    <p:cTn id="21" fill="hold">
                       <p:stCondLst>
                         <p:cond delay="indefinite"/>
                       </p:stCondLst>
                       <p:childTnLst>
                         <p:par>
-                          <p:cTn id="18" fill="hold">
+                          <p:cTn id="22" fill="hold">
                             <p:stCondLst>
                               <p:cond delay="0"/>
                             </p:stCondLst>
                             <p:childTnLst>
                               <p:par>
-                                <p:cTn id="19" presetID="2" presetClass="entr" presetSubtype="2" fill="hold" nodeType="clickEffect">
+                                <p:cTn id="23" presetID="2" presetClass="entr" presetSubtype="2" fill="hold" nodeType="clickEffect">
                                   <p:stCondLst>
                                     <p:cond delay="0"/>
                                   </p:stCondLst>
                                   <p:childTnLst>
                                     <p:set>
                                       <p:cBhvr>
-                                        <p:cTn id="20" dur="1" fill="hold">
+                                        <p:cTn id="24" dur="1" fill="hold">
                                           <p:stCondLst>
                                             <p:cond delay="0"/>
                                           </p:stCondLst>
@@ -9888,7 +10075,7 @@
                                     </p:set>
                                     <p:anim calcmode="lin" valueType="num">
                                       <p:cBhvr additive="base">
-                                        <p:cTn id="21" dur="500" fill="hold"/>
+                                        <p:cTn id="25" dur="500" fill="hold"/>
                                         <p:tgtEl>
                                           <p:spTgt spid="6"/>
                                         </p:tgtEl>
@@ -9911,7 +10098,7 @@
                                     </p:anim>
                                     <p:anim calcmode="lin" valueType="num">
                                       <p:cBhvr additive="base">
-                                        <p:cTn id="22" dur="500" fill="hold"/>
+                                        <p:cTn id="26" dur="500" fill="hold"/>
                                         <p:tgtEl>
                                           <p:spTgt spid="6"/>
                                         </p:tgtEl>
@@ -9936,14 +10123,14 @@
                                 </p:cTn>
                               </p:par>
                               <p:par>
-                                <p:cTn id="23" presetID="2" presetClass="entr" presetSubtype="2" fill="hold" grpId="0" nodeType="withEffect">
+                                <p:cTn id="27" presetID="2" presetClass="entr" presetSubtype="2" fill="hold" grpId="0" nodeType="withEffect">
                                   <p:stCondLst>
                                     <p:cond delay="0"/>
                                   </p:stCondLst>
                                   <p:childTnLst>
                                     <p:set>
                                       <p:cBhvr>
-                                        <p:cTn id="24" dur="1" fill="hold">
+                                        <p:cTn id="28" dur="1" fill="hold">
                                           <p:stCondLst>
                                             <p:cond delay="0"/>
                                           </p:stCondLst>
@@ -9961,7 +10148,7 @@
                                     </p:set>
                                     <p:anim calcmode="lin" valueType="num">
                                       <p:cBhvr additive="base">
-                                        <p:cTn id="25" dur="500" fill="hold"/>
+                                        <p:cTn id="29" dur="500" fill="hold"/>
                                         <p:tgtEl>
                                           <p:spTgt spid="14"/>
                                         </p:tgtEl>
@@ -9984,7 +10171,7 @@
                                     </p:anim>
                                     <p:anim calcmode="lin" valueType="num">
                                       <p:cBhvr additive="base">
-                                        <p:cTn id="26" dur="500" fill="hold"/>
+                                        <p:cTn id="30" dur="500" fill="hold"/>
                                         <p:tgtEl>
                                           <p:spTgt spid="14"/>
                                         </p:tgtEl>
@@ -10015,26 +10202,26 @@
                     </p:cTn>
                   </p:par>
                   <p:par>
-                    <p:cTn id="27" fill="hold">
+                    <p:cTn id="31" fill="hold">
                       <p:stCondLst>
                         <p:cond delay="indefinite"/>
                       </p:stCondLst>
                       <p:childTnLst>
                         <p:par>
-                          <p:cTn id="28" fill="hold">
+                          <p:cTn id="32" fill="hold">
                             <p:stCondLst>
                               <p:cond delay="0"/>
                             </p:stCondLst>
                             <p:childTnLst>
                               <p:par>
-                                <p:cTn id="29" presetID="2" presetClass="entr" presetSubtype="4" fill="hold" nodeType="clickEffect">
+                                <p:cTn id="33" presetID="2" presetClass="entr" presetSubtype="4" fill="hold" nodeType="clickEffect">
                                   <p:stCondLst>
                                     <p:cond delay="0"/>
                                   </p:stCondLst>
                                   <p:childTnLst>
                                     <p:set>
                                       <p:cBhvr>
-                                        <p:cTn id="30" dur="1" fill="hold">
+                                        <p:cTn id="34" dur="1" fill="hold">
                                           <p:stCondLst>
                                             <p:cond delay="0"/>
                                           </p:stCondLst>
@@ -10052,7 +10239,7 @@
                                     </p:set>
                                     <p:anim calcmode="lin" valueType="num">
                                       <p:cBhvr additive="base">
-                                        <p:cTn id="31" dur="500" fill="hold"/>
+                                        <p:cTn id="35" dur="500" fill="hold"/>
                                         <p:tgtEl>
                                           <p:spTgt spid="7"/>
                                         </p:tgtEl>
@@ -10075,7 +10262,7 @@
                                     </p:anim>
                                     <p:anim calcmode="lin" valueType="num">
                                       <p:cBhvr additive="base">
-                                        <p:cTn id="32" dur="500" fill="hold"/>
+                                        <p:cTn id="36" dur="500" fill="hold"/>
                                         <p:tgtEl>
                                           <p:spTgt spid="7"/>
                                         </p:tgtEl>
@@ -10100,14 +10287,14 @@
                                 </p:cTn>
                               </p:par>
                               <p:par>
-                                <p:cTn id="33" presetID="2" presetClass="entr" presetSubtype="4" fill="hold" grpId="0" nodeType="withEffect">
+                                <p:cTn id="37" presetID="2" presetClass="entr" presetSubtype="4" fill="hold" grpId="0" nodeType="withEffect">
                                   <p:stCondLst>
                                     <p:cond delay="0"/>
                                   </p:stCondLst>
                                   <p:childTnLst>
                                     <p:set>
                                       <p:cBhvr>
-                                        <p:cTn id="34" dur="1" fill="hold">
+                                        <p:cTn id="38" dur="1" fill="hold">
                                           <p:stCondLst>
                                             <p:cond delay="0"/>
                                           </p:stCondLst>
@@ -10125,7 +10312,7 @@
                                     </p:set>
                                     <p:anim calcmode="lin" valueType="num">
                                       <p:cBhvr additive="base">
-                                        <p:cTn id="35" dur="500" fill="hold"/>
+                                        <p:cTn id="39" dur="500" fill="hold"/>
                                         <p:tgtEl>
                                           <p:spTgt spid="15"/>
                                         </p:tgtEl>
@@ -10148,7 +10335,7 @@
                                     </p:anim>
                                     <p:anim calcmode="lin" valueType="num">
                                       <p:cBhvr additive="base">
-                                        <p:cTn id="36" dur="500" fill="hold"/>
+                                        <p:cTn id="40" dur="500" fill="hold"/>
                                         <p:tgtEl>
                                           <p:spTgt spid="15"/>
                                         </p:tgtEl>
@@ -10179,26 +10366,26 @@
                     </p:cTn>
                   </p:par>
                   <p:par>
-                    <p:cTn id="37" fill="hold">
+                    <p:cTn id="41" fill="hold">
                       <p:stCondLst>
                         <p:cond delay="indefinite"/>
                       </p:stCondLst>
                       <p:childTnLst>
                         <p:par>
-                          <p:cTn id="38" fill="hold">
+                          <p:cTn id="42" fill="hold">
                             <p:stCondLst>
                               <p:cond delay="0"/>
                             </p:stCondLst>
                             <p:childTnLst>
                               <p:par>
-                                <p:cTn id="39" presetID="2" presetClass="entr" presetSubtype="4" fill="hold" nodeType="clickEffect">
+                                <p:cTn id="43" presetID="2" presetClass="entr" presetSubtype="4" fill="hold" nodeType="clickEffect">
                                   <p:stCondLst>
                                     <p:cond delay="0"/>
                                   </p:stCondLst>
                                   <p:childTnLst>
                                     <p:set>
                                       <p:cBhvr>
-                                        <p:cTn id="40" dur="1" fill="hold">
+                                        <p:cTn id="44" dur="1" fill="hold">
                                           <p:stCondLst>
                                             <p:cond delay="0"/>
                                           </p:stCondLst>
@@ -10216,7 +10403,7 @@
                                     </p:set>
                                     <p:anim calcmode="lin" valueType="num">
                                       <p:cBhvr additive="base">
-                                        <p:cTn id="41" dur="500" fill="hold"/>
+                                        <p:cTn id="45" dur="500" fill="hold"/>
                                         <p:tgtEl>
                                           <p:spTgt spid="8"/>
                                         </p:tgtEl>
@@ -10239,7 +10426,7 @@
                                     </p:anim>
                                     <p:anim calcmode="lin" valueType="num">
                                       <p:cBhvr additive="base">
-                                        <p:cTn id="42" dur="500" fill="hold"/>
+                                        <p:cTn id="46" dur="500" fill="hold"/>
                                         <p:tgtEl>
                                           <p:spTgt spid="8"/>
                                         </p:tgtEl>
@@ -10264,14 +10451,14 @@
                                 </p:cTn>
                               </p:par>
                               <p:par>
-                                <p:cTn id="43" presetID="2" presetClass="entr" presetSubtype="4" fill="hold" grpId="0" nodeType="withEffect">
+                                <p:cTn id="47" presetID="2" presetClass="entr" presetSubtype="4" fill="hold" grpId="0" nodeType="withEffect">
                                   <p:stCondLst>
                                     <p:cond delay="0"/>
                                   </p:stCondLst>
                                   <p:childTnLst>
                                     <p:set>
                                       <p:cBhvr>
-                                        <p:cTn id="44" dur="1" fill="hold">
+                                        <p:cTn id="48" dur="1" fill="hold">
                                           <p:stCondLst>
                                             <p:cond delay="0"/>
                                           </p:stCondLst>
@@ -10289,7 +10476,7 @@
                                     </p:set>
                                     <p:anim calcmode="lin" valueType="num">
                                       <p:cBhvr additive="base">
-                                        <p:cTn id="45" dur="500" fill="hold"/>
+                                        <p:cTn id="49" dur="500" fill="hold"/>
                                         <p:tgtEl>
                                           <p:spTgt spid="13"/>
                                         </p:tgtEl>
@@ -10312,7 +10499,7 @@
                                     </p:anim>
                                     <p:anim calcmode="lin" valueType="num">
                                       <p:cBhvr additive="base">
-                                        <p:cTn id="46" dur="500" fill="hold"/>
+                                        <p:cTn id="50" dur="500" fill="hold"/>
                                         <p:tgtEl>
                                           <p:spTgt spid="13"/>
                                         </p:tgtEl>
@@ -10367,6 +10554,7 @@
       <p:bldP spid="13" grpId="0"/>
       <p:bldP spid="14" grpId="0"/>
       <p:bldP spid="15" grpId="0"/>
+      <p:bldP spid="16" grpId="0"/>
     </p:bldLst>
   </p:timing>
 </p:sld>
@@ -10414,7 +10602,7 @@
           <a:p>
             <a:r>
               <a:rPr lang="en-US" sz="3600" dirty="0"/>
-              <a:t>Problem #2 – How do we structure so we can iterate quickly?</a:t>
+              <a:t>Problem #2 – How do we structure so we can easily maintain?</a:t>
             </a:r>
           </a:p>
         </p:txBody>
@@ -11258,8 +11446,13 @@
             </a:pPr>
             <a:r>
               <a:rPr lang="en-US" sz="1800" b="1" dirty="0"/>
-              <a:t>Problem #2: How do we structure so we can iterate quickly?</a:t>
-            </a:r>
+              <a:t>Problem #2: How do we structure so we </a:t>
+            </a:r>
+            <a:r>
+              <a:rPr lang="en-US" sz="1800" b="1"/>
+              <a:t>can easily maintain?</a:t>
+            </a:r>
+            <a:endParaRPr lang="en-US" sz="1800" b="1" dirty="0"/>
           </a:p>
           <a:p>
             <a:pPr lvl="1"/>

</xml_diff>